<commit_message>
Changed design on reporting page - need to update powerpoint
</commit_message>
<xml_diff>
--- a/design-deliverables/v.11/_doc/pro_reports_page.pptx
+++ b/design-deliverables/v.11/_doc/pro_reports_page.pptx
@@ -113,7 +113,16 @@
       </a:defRPr>
     </a:lvl9pPr>
   </p:defaultTextStyle>
+  <p:extLst>
+    <p:ext uri="{EFAFB233-063F-42B5-8137-9DF3F51BA10A}">
+      <p15:sldGuideLst xmlns:p15="http://schemas.microsoft.com/office/powerpoint/2012/main"/>
+    </p:ext>
+  </p:extLst>
 </p:presentation>
+</file>
+
+<file path=ppt/revisionInfo.xml><?xml version="1.0" encoding="utf-8"?>
+<p1510:revInfo xmlns:a="http://schemas.openxmlformats.org/drawingml/2006/main" xmlns:r="http://schemas.openxmlformats.org/officeDocument/2006/relationships" xmlns:p1510="http://schemas.microsoft.com/office/powerpoint/2015/10/main"/>
 </file>
 
 <file path=ppt/slideLayouts/slideLayout1.xml><?xml version="1.0" encoding="utf-8"?>
@@ -3575,7 +3584,7 @@
         </p:nvSpPr>
         <p:spPr>
           <a:xfrm>
-            <a:off x="8430936" y="868509"/>
+            <a:off x="8421411" y="868509"/>
             <a:ext cx="293534" cy="293534"/>
           </a:xfrm>
           <a:prstGeom prst="ellipse">
@@ -3629,7 +3638,7 @@
         </p:nvSpPr>
         <p:spPr>
           <a:xfrm>
-            <a:off x="8443520" y="872629"/>
+            <a:off x="8433995" y="872629"/>
             <a:ext cx="1146276" cy="276999"/>
           </a:xfrm>
           <a:prstGeom prst="rect">

</xml_diff>